<commit_message>
Updating my lstm prediction code
</commit_message>
<xml_diff>
--- a/MSR-Exploring_LSTM_Outputs.pptx
+++ b/MSR-Exploring_LSTM_Outputs.pptx
@@ -109,6 +109,11 @@
       </a:defRPr>
     </a:lvl9pPr>
   </p:defaultTextStyle>
+  <p:extLst>
+    <p:ext uri="{EFAFB233-063F-42B5-8137-9DF3F51BA10A}">
+      <p15:sldGuideLst xmlns:p15="http://schemas.microsoft.com/office/powerpoint/2012/main"/>
+    </p:ext>
+  </p:extLst>
 </p:presentation>
 </file>
 
@@ -259,7 +264,7 @@
           <a:p>
             <a:fld id="{DAAE9C43-0F75-4265-BB64-A35B96A421E1}" type="datetimeFigureOut">
               <a:rPr lang="en-US" smtClean="0"/>
-              <a:t>4/2/2020</a:t>
+              <a:t>4/4/2020</a:t>
             </a:fld>
             <a:endParaRPr lang="en-US"/>
           </a:p>
@@ -457,7 +462,7 @@
           <a:p>
             <a:fld id="{DAAE9C43-0F75-4265-BB64-A35B96A421E1}" type="datetimeFigureOut">
               <a:rPr lang="en-US" smtClean="0"/>
-              <a:t>4/2/2020</a:t>
+              <a:t>4/4/2020</a:t>
             </a:fld>
             <a:endParaRPr lang="en-US"/>
           </a:p>
@@ -665,7 +670,7 @@
           <a:p>
             <a:fld id="{DAAE9C43-0F75-4265-BB64-A35B96A421E1}" type="datetimeFigureOut">
               <a:rPr lang="en-US" smtClean="0"/>
-              <a:t>4/2/2020</a:t>
+              <a:t>4/4/2020</a:t>
             </a:fld>
             <a:endParaRPr lang="en-US"/>
           </a:p>
@@ -863,7 +868,7 @@
           <a:p>
             <a:fld id="{DAAE9C43-0F75-4265-BB64-A35B96A421E1}" type="datetimeFigureOut">
               <a:rPr lang="en-US" smtClean="0"/>
-              <a:t>4/2/2020</a:t>
+              <a:t>4/4/2020</a:t>
             </a:fld>
             <a:endParaRPr lang="en-US"/>
           </a:p>
@@ -1138,7 +1143,7 @@
           <a:p>
             <a:fld id="{DAAE9C43-0F75-4265-BB64-A35B96A421E1}" type="datetimeFigureOut">
               <a:rPr lang="en-US" smtClean="0"/>
-              <a:t>4/2/2020</a:t>
+              <a:t>4/4/2020</a:t>
             </a:fld>
             <a:endParaRPr lang="en-US"/>
           </a:p>
@@ -1403,7 +1408,7 @@
           <a:p>
             <a:fld id="{DAAE9C43-0F75-4265-BB64-A35B96A421E1}" type="datetimeFigureOut">
               <a:rPr lang="en-US" smtClean="0"/>
-              <a:t>4/2/2020</a:t>
+              <a:t>4/4/2020</a:t>
             </a:fld>
             <a:endParaRPr lang="en-US"/>
           </a:p>
@@ -1815,7 +1820,7 @@
           <a:p>
             <a:fld id="{DAAE9C43-0F75-4265-BB64-A35B96A421E1}" type="datetimeFigureOut">
               <a:rPr lang="en-US" smtClean="0"/>
-              <a:t>4/2/2020</a:t>
+              <a:t>4/4/2020</a:t>
             </a:fld>
             <a:endParaRPr lang="en-US"/>
           </a:p>
@@ -1956,7 +1961,7 @@
           <a:p>
             <a:fld id="{DAAE9C43-0F75-4265-BB64-A35B96A421E1}" type="datetimeFigureOut">
               <a:rPr lang="en-US" smtClean="0"/>
-              <a:t>4/2/2020</a:t>
+              <a:t>4/4/2020</a:t>
             </a:fld>
             <a:endParaRPr lang="en-US"/>
           </a:p>
@@ -2069,7 +2074,7 @@
           <a:p>
             <a:fld id="{DAAE9C43-0F75-4265-BB64-A35B96A421E1}" type="datetimeFigureOut">
               <a:rPr lang="en-US" smtClean="0"/>
-              <a:t>4/2/2020</a:t>
+              <a:t>4/4/2020</a:t>
             </a:fld>
             <a:endParaRPr lang="en-US"/>
           </a:p>
@@ -2380,7 +2385,7 @@
           <a:p>
             <a:fld id="{DAAE9C43-0F75-4265-BB64-A35B96A421E1}" type="datetimeFigureOut">
               <a:rPr lang="en-US" smtClean="0"/>
-              <a:t>4/2/2020</a:t>
+              <a:t>4/4/2020</a:t>
             </a:fld>
             <a:endParaRPr lang="en-US"/>
           </a:p>
@@ -2668,7 +2673,7 @@
           <a:p>
             <a:fld id="{DAAE9C43-0F75-4265-BB64-A35B96A421E1}" type="datetimeFigureOut">
               <a:rPr lang="en-US" smtClean="0"/>
-              <a:t>4/2/2020</a:t>
+              <a:t>4/4/2020</a:t>
             </a:fld>
             <a:endParaRPr lang="en-US"/>
           </a:p>
@@ -2909,7 +2914,7 @@
           <a:p>
             <a:fld id="{DAAE9C43-0F75-4265-BB64-A35B96A421E1}" type="datetimeFigureOut">
               <a:rPr lang="en-US" smtClean="0"/>
-              <a:t>4/2/2020</a:t>
+              <a:t>4/4/2020</a:t>
             </a:fld>
             <a:endParaRPr lang="en-US"/>
           </a:p>

</xml_diff>

<commit_message>
MSR lstm adjustment. Added the 5 day look ahead period to the plots and compared to actual. Turns out closing price with our model is a terrible predictor for performance.
</commit_message>
<xml_diff>
--- a/MSR-Exploring_LSTM_Outputs.pptx
+++ b/MSR-Exploring_LSTM_Outputs.pptx
@@ -11,6 +11,8 @@
     <p:sldId id="259" r:id="rId5"/>
     <p:sldId id="260" r:id="rId6"/>
     <p:sldId id="261" r:id="rId7"/>
+    <p:sldId id="262" r:id="rId8"/>
+    <p:sldId id="263" r:id="rId9"/>
   </p:sldIdLst>
   <p:sldSz cx="12192000" cy="6858000"/>
   <p:notesSz cx="6858000" cy="9144000"/>
@@ -4288,6 +4290,295 @@
 </p:sld>
 </file>
 
+<file path=ppt/slides/slide7.xml><?xml version="1.0" encoding="utf-8"?>
+<p:sld xmlns:a="http://schemas.openxmlformats.org/drawingml/2006/main" xmlns:r="http://schemas.openxmlformats.org/officeDocument/2006/relationships" xmlns:p="http://schemas.openxmlformats.org/presentationml/2006/main">
+  <p:cSld>
+    <p:spTree>
+      <p:nvGrpSpPr>
+        <p:cNvPr id="1" name=""/>
+        <p:cNvGrpSpPr/>
+        <p:nvPr/>
+      </p:nvGrpSpPr>
+      <p:grpSpPr>
+        <a:xfrm>
+          <a:off x="0" y="0"/>
+          <a:ext cx="0" cy="0"/>
+          <a:chOff x="0" y="0"/>
+          <a:chExt cx="0" cy="0"/>
+        </a:xfrm>
+      </p:grpSpPr>
+      <p:sp>
+        <p:nvSpPr>
+          <p:cNvPr id="2" name="Title 1">
+            <a:extLst>
+              <a:ext uri="{FF2B5EF4-FFF2-40B4-BE49-F238E27FC236}">
+                <a16:creationId xmlns:a16="http://schemas.microsoft.com/office/drawing/2014/main" id="{8CA281AF-6041-45FC-A667-FCC78F8D022D}"/>
+              </a:ext>
+            </a:extLst>
+          </p:cNvPr>
+          <p:cNvSpPr>
+            <a:spLocks noGrp="1"/>
+          </p:cNvSpPr>
+          <p:nvPr>
+            <p:ph type="title"/>
+          </p:nvPr>
+        </p:nvSpPr>
+        <p:spPr/>
+        <p:txBody>
+          <a:bodyPr/>
+          <a:lstStyle/>
+          <a:p>
+            <a:endParaRPr lang="en-US"/>
+          </a:p>
+        </p:txBody>
+      </p:sp>
+      <p:sp>
+        <p:nvSpPr>
+          <p:cNvPr id="3" name="Content Placeholder 2">
+            <a:extLst>
+              <a:ext uri="{FF2B5EF4-FFF2-40B4-BE49-F238E27FC236}">
+                <a16:creationId xmlns:a16="http://schemas.microsoft.com/office/drawing/2014/main" id="{594C1420-4D03-40E4-A132-DE4AD19C9D3E}"/>
+              </a:ext>
+            </a:extLst>
+          </p:cNvPr>
+          <p:cNvSpPr>
+            <a:spLocks noGrp="1"/>
+          </p:cNvSpPr>
+          <p:nvPr>
+            <p:ph idx="1"/>
+          </p:nvPr>
+        </p:nvSpPr>
+        <p:spPr/>
+        <p:txBody>
+          <a:bodyPr/>
+          <a:lstStyle/>
+          <a:p>
+            <a:r>
+              <a:rPr lang="en-US" dirty="0"/>
+              <a:t>Window size of 5</a:t>
+            </a:r>
+          </a:p>
+          <a:p>
+            <a:r>
+              <a:rPr lang="en-US" dirty="0"/>
+              <a:t>Length and Target adjustment of 1</a:t>
+            </a:r>
+          </a:p>
+        </p:txBody>
+      </p:sp>
+      <p:pic>
+        <p:nvPicPr>
+          <p:cNvPr id="4" name="Picture 3">
+            <a:extLst>
+              <a:ext uri="{FF2B5EF4-FFF2-40B4-BE49-F238E27FC236}">
+                <a16:creationId xmlns:a16="http://schemas.microsoft.com/office/drawing/2014/main" id="{F2B3BE43-011D-4A67-90AD-F06E0A1A7836}"/>
+              </a:ext>
+            </a:extLst>
+          </p:cNvPr>
+          <p:cNvPicPr>
+            <a:picLocks noChangeAspect="1"/>
+          </p:cNvPicPr>
+          <p:nvPr/>
+        </p:nvPicPr>
+        <p:blipFill>
+          <a:blip r:embed="rId2"/>
+          <a:stretch>
+            <a:fillRect/>
+          </a:stretch>
+        </p:blipFill>
+        <p:spPr>
+          <a:xfrm>
+            <a:off x="6387969" y="282512"/>
+            <a:ext cx="5073911" cy="2425825"/>
+          </a:xfrm>
+          <a:prstGeom prst="rect">
+            <a:avLst/>
+          </a:prstGeom>
+        </p:spPr>
+      </p:pic>
+      <p:pic>
+        <p:nvPicPr>
+          <p:cNvPr id="5" name="Picture 4">
+            <a:extLst>
+              <a:ext uri="{FF2B5EF4-FFF2-40B4-BE49-F238E27FC236}">
+                <a16:creationId xmlns:a16="http://schemas.microsoft.com/office/drawing/2014/main" id="{D49FBFCC-F6B9-4AF1-95D8-254EA494AA37}"/>
+              </a:ext>
+            </a:extLst>
+          </p:cNvPr>
+          <p:cNvPicPr>
+            <a:picLocks noChangeAspect="1"/>
+          </p:cNvPicPr>
+          <p:nvPr/>
+        </p:nvPicPr>
+        <p:blipFill>
+          <a:blip r:embed="rId3"/>
+          <a:stretch>
+            <a:fillRect/>
+          </a:stretch>
+        </p:blipFill>
+        <p:spPr>
+          <a:xfrm>
+            <a:off x="561979" y="3113088"/>
+            <a:ext cx="5292589" cy="3063875"/>
+          </a:xfrm>
+          <a:prstGeom prst="rect">
+            <a:avLst/>
+          </a:prstGeom>
+        </p:spPr>
+      </p:pic>
+      <p:pic>
+        <p:nvPicPr>
+          <p:cNvPr id="6" name="Picture 5">
+            <a:extLst>
+              <a:ext uri="{FF2B5EF4-FFF2-40B4-BE49-F238E27FC236}">
+                <a16:creationId xmlns:a16="http://schemas.microsoft.com/office/drawing/2014/main" id="{7B9498F9-68CA-415F-8923-FE647B90F7EE}"/>
+              </a:ext>
+            </a:extLst>
+          </p:cNvPr>
+          <p:cNvPicPr>
+            <a:picLocks noChangeAspect="1"/>
+          </p:cNvPicPr>
+          <p:nvPr/>
+        </p:nvPicPr>
+        <p:blipFill>
+          <a:blip r:embed="rId4"/>
+          <a:stretch>
+            <a:fillRect/>
+          </a:stretch>
+        </p:blipFill>
+        <p:spPr>
+          <a:xfrm>
+            <a:off x="5734050" y="2978151"/>
+            <a:ext cx="4032396" cy="2842952"/>
+          </a:xfrm>
+          <a:prstGeom prst="rect">
+            <a:avLst/>
+          </a:prstGeom>
+        </p:spPr>
+      </p:pic>
+      <p:pic>
+        <p:nvPicPr>
+          <p:cNvPr id="7" name="Picture 6">
+            <a:extLst>
+              <a:ext uri="{FF2B5EF4-FFF2-40B4-BE49-F238E27FC236}">
+                <a16:creationId xmlns:a16="http://schemas.microsoft.com/office/drawing/2014/main" id="{055ECB52-D252-46D4-9F99-40A853F16BF3}"/>
+              </a:ext>
+            </a:extLst>
+          </p:cNvPr>
+          <p:cNvPicPr>
+            <a:picLocks noChangeAspect="1"/>
+          </p:cNvPicPr>
+          <p:nvPr/>
+        </p:nvPicPr>
+        <p:blipFill>
+          <a:blip r:embed="rId5"/>
+          <a:stretch>
+            <a:fillRect/>
+          </a:stretch>
+        </p:blipFill>
+        <p:spPr>
+          <a:xfrm>
+            <a:off x="1780953" y="733286"/>
+            <a:ext cx="8630094" cy="5391427"/>
+          </a:xfrm>
+          <a:prstGeom prst="rect">
+            <a:avLst/>
+          </a:prstGeom>
+        </p:spPr>
+      </p:pic>
+    </p:spTree>
+    <p:extLst>
+      <p:ext uri="{BB962C8B-B14F-4D97-AF65-F5344CB8AC3E}">
+        <p14:creationId xmlns:p14="http://schemas.microsoft.com/office/powerpoint/2010/main" val="1249084195"/>
+      </p:ext>
+    </p:extLst>
+  </p:cSld>
+  <p:clrMapOvr>
+    <a:masterClrMapping/>
+  </p:clrMapOvr>
+</p:sld>
+</file>
+
+<file path=ppt/slides/slide8.xml><?xml version="1.0" encoding="utf-8"?>
+<p:sld xmlns:a="http://schemas.openxmlformats.org/drawingml/2006/main" xmlns:r="http://schemas.openxmlformats.org/officeDocument/2006/relationships" xmlns:p="http://schemas.openxmlformats.org/presentationml/2006/main">
+  <p:cSld>
+    <p:spTree>
+      <p:nvGrpSpPr>
+        <p:cNvPr id="1" name=""/>
+        <p:cNvGrpSpPr/>
+        <p:nvPr/>
+      </p:nvGrpSpPr>
+      <p:grpSpPr>
+        <a:xfrm>
+          <a:off x="0" y="0"/>
+          <a:ext cx="0" cy="0"/>
+          <a:chOff x="0" y="0"/>
+          <a:chExt cx="0" cy="0"/>
+        </a:xfrm>
+      </p:grpSpPr>
+      <p:sp>
+        <p:nvSpPr>
+          <p:cNvPr id="2" name="Title 1">
+            <a:extLst>
+              <a:ext uri="{FF2B5EF4-FFF2-40B4-BE49-F238E27FC236}">
+                <a16:creationId xmlns:a16="http://schemas.microsoft.com/office/drawing/2014/main" id="{173DE6C0-C22C-48CF-B614-7E141157A99E}"/>
+              </a:ext>
+            </a:extLst>
+          </p:cNvPr>
+          <p:cNvSpPr>
+            <a:spLocks noGrp="1"/>
+          </p:cNvSpPr>
+          <p:nvPr>
+            <p:ph type="title"/>
+          </p:nvPr>
+        </p:nvSpPr>
+        <p:spPr/>
+        <p:txBody>
+          <a:bodyPr/>
+          <a:lstStyle/>
+          <a:p>
+            <a:endParaRPr lang="en-US"/>
+          </a:p>
+        </p:txBody>
+      </p:sp>
+      <p:sp>
+        <p:nvSpPr>
+          <p:cNvPr id="3" name="Content Placeholder 2">
+            <a:extLst>
+              <a:ext uri="{FF2B5EF4-FFF2-40B4-BE49-F238E27FC236}">
+                <a16:creationId xmlns:a16="http://schemas.microsoft.com/office/drawing/2014/main" id="{A5412B05-6477-47AB-A9B4-ECAFD3C7FBB2}"/>
+              </a:ext>
+            </a:extLst>
+          </p:cNvPr>
+          <p:cNvSpPr>
+            <a:spLocks noGrp="1"/>
+          </p:cNvSpPr>
+          <p:nvPr>
+            <p:ph idx="1"/>
+          </p:nvPr>
+        </p:nvSpPr>
+        <p:spPr/>
+        <p:txBody>
+          <a:bodyPr/>
+          <a:lstStyle/>
+          <a:p>
+            <a:endParaRPr lang="en-US"/>
+          </a:p>
+        </p:txBody>
+      </p:sp>
+    </p:spTree>
+    <p:extLst>
+      <p:ext uri="{BB962C8B-B14F-4D97-AF65-F5344CB8AC3E}">
+        <p14:creationId xmlns:p14="http://schemas.microsoft.com/office/powerpoint/2010/main" val="1892737031"/>
+      </p:ext>
+    </p:extLst>
+  </p:cSld>
+  <p:clrMapOvr>
+    <a:masterClrMapping/>
+  </p:clrMapOvr>
+</p:sld>
+</file>
+
 <file path=ppt/theme/theme1.xml><?xml version="1.0" encoding="utf-8"?>
 <a:theme xmlns:a="http://schemas.openxmlformats.org/drawingml/2006/main" name="Office Theme">
   <a:themeElements>

</xml_diff>